<commit_message>
doc update: remove mention of private subnets from architecture
</commit_message>
<xml_diff>
--- a/docs/images/architecture_diagram.pptx
+++ b/docs/images/architecture_diagram.pptx
@@ -197,7 +197,7 @@
           <a:p>
             <a:fld id="{CB656217-EE12-5F41-8D0C-96ED1FEFEADC}" type="datetimeFigureOut">
               <a:rPr lang="en-US" smtClean="0"/>
-              <a:t>10/12/21</a:t>
+              <a:t>2/20/23</a:t>
             </a:fld>
             <a:endParaRPr lang="en-US"/>
           </a:p>
@@ -695,7 +695,7 @@
           <a:p>
             <a:fld id="{6244D3B9-4146-964F-9E7E-473F62F24AD4}" type="datetimeFigureOut">
               <a:rPr lang="en-US" smtClean="0"/>
-              <a:t>10/12/21</a:t>
+              <a:t>2/20/23</a:t>
             </a:fld>
             <a:endParaRPr lang="en-US"/>
           </a:p>
@@ -893,7 +893,7 @@
           <a:p>
             <a:fld id="{6244D3B9-4146-964F-9E7E-473F62F24AD4}" type="datetimeFigureOut">
               <a:rPr lang="en-US" smtClean="0"/>
-              <a:t>10/12/21</a:t>
+              <a:t>2/20/23</a:t>
             </a:fld>
             <a:endParaRPr lang="en-US"/>
           </a:p>
@@ -1101,7 +1101,7 @@
           <a:p>
             <a:fld id="{6244D3B9-4146-964F-9E7E-473F62F24AD4}" type="datetimeFigureOut">
               <a:rPr lang="en-US" smtClean="0"/>
-              <a:t>10/12/21</a:t>
+              <a:t>2/20/23</a:t>
             </a:fld>
             <a:endParaRPr lang="en-US"/>
           </a:p>
@@ -1299,7 +1299,7 @@
           <a:p>
             <a:fld id="{6244D3B9-4146-964F-9E7E-473F62F24AD4}" type="datetimeFigureOut">
               <a:rPr lang="en-US" smtClean="0"/>
-              <a:t>10/12/21</a:t>
+              <a:t>2/20/23</a:t>
             </a:fld>
             <a:endParaRPr lang="en-US"/>
           </a:p>
@@ -1574,7 +1574,7 @@
           <a:p>
             <a:fld id="{6244D3B9-4146-964F-9E7E-473F62F24AD4}" type="datetimeFigureOut">
               <a:rPr lang="en-US" smtClean="0"/>
-              <a:t>10/12/21</a:t>
+              <a:t>2/20/23</a:t>
             </a:fld>
             <a:endParaRPr lang="en-US"/>
           </a:p>
@@ -1839,7 +1839,7 @@
           <a:p>
             <a:fld id="{6244D3B9-4146-964F-9E7E-473F62F24AD4}" type="datetimeFigureOut">
               <a:rPr lang="en-US" smtClean="0"/>
-              <a:t>10/12/21</a:t>
+              <a:t>2/20/23</a:t>
             </a:fld>
             <a:endParaRPr lang="en-US"/>
           </a:p>
@@ -2251,7 +2251,7 @@
           <a:p>
             <a:fld id="{6244D3B9-4146-964F-9E7E-473F62F24AD4}" type="datetimeFigureOut">
               <a:rPr lang="en-US" smtClean="0"/>
-              <a:t>10/12/21</a:t>
+              <a:t>2/20/23</a:t>
             </a:fld>
             <a:endParaRPr lang="en-US"/>
           </a:p>
@@ -2392,7 +2392,7 @@
           <a:p>
             <a:fld id="{6244D3B9-4146-964F-9E7E-473F62F24AD4}" type="datetimeFigureOut">
               <a:rPr lang="en-US" smtClean="0"/>
-              <a:t>10/12/21</a:t>
+              <a:t>2/20/23</a:t>
             </a:fld>
             <a:endParaRPr lang="en-US"/>
           </a:p>
@@ -2505,7 +2505,7 @@
           <a:p>
             <a:fld id="{6244D3B9-4146-964F-9E7E-473F62F24AD4}" type="datetimeFigureOut">
               <a:rPr lang="en-US" smtClean="0"/>
-              <a:t>10/12/21</a:t>
+              <a:t>2/20/23</a:t>
             </a:fld>
             <a:endParaRPr lang="en-US"/>
           </a:p>
@@ -2816,7 +2816,7 @@
           <a:p>
             <a:fld id="{6244D3B9-4146-964F-9E7E-473F62F24AD4}" type="datetimeFigureOut">
               <a:rPr lang="en-US" smtClean="0"/>
-              <a:t>10/12/21</a:t>
+              <a:t>2/20/23</a:t>
             </a:fld>
             <a:endParaRPr lang="en-US"/>
           </a:p>
@@ -3104,7 +3104,7 @@
           <a:p>
             <a:fld id="{6244D3B9-4146-964F-9E7E-473F62F24AD4}" type="datetimeFigureOut">
               <a:rPr lang="en-US" smtClean="0"/>
-              <a:t>10/12/21</a:t>
+              <a:t>2/20/23</a:t>
             </a:fld>
             <a:endParaRPr lang="en-US"/>
           </a:p>
@@ -3345,7 +3345,7 @@
           <a:p>
             <a:fld id="{6244D3B9-4146-964F-9E7E-473F62F24AD4}" type="datetimeFigureOut">
               <a:rPr lang="en-US" smtClean="0"/>
-              <a:t>10/12/21</a:t>
+              <a:t>2/20/23</a:t>
             </a:fld>
             <a:endParaRPr lang="en-US"/>
           </a:p>
@@ -3776,7 +3776,7 @@
         </p:nvSpPr>
         <p:spPr>
           <a:xfrm>
-            <a:off x="3557259" y="4872085"/>
+            <a:off x="3557259" y="4571061"/>
             <a:ext cx="1202792" cy="1027692"/>
           </a:xfrm>
           <a:prstGeom prst="rect">
@@ -4099,7 +4099,7 @@
         </p:blipFill>
         <p:spPr>
           <a:xfrm>
-            <a:off x="3980970" y="5202759"/>
+            <a:off x="3953094" y="4901735"/>
             <a:ext cx="304632" cy="287901"/>
           </a:xfrm>
           <a:prstGeom prst="rect">
@@ -4121,7 +4121,7 @@
         </p:nvSpPr>
         <p:spPr>
           <a:xfrm>
-            <a:off x="2445368" y="6010228"/>
+            <a:off x="2445368" y="5709204"/>
             <a:ext cx="961460" cy="373113"/>
           </a:xfrm>
           <a:prstGeom prst="rect">
@@ -4183,8 +4183,8 @@
         </p:nvSpPr>
         <p:spPr>
           <a:xfrm>
-            <a:off x="1999698" y="1594570"/>
-            <a:ext cx="1931507" cy="3225763"/>
+            <a:off x="1994018" y="1594571"/>
+            <a:ext cx="1931507" cy="2622424"/>
           </a:xfrm>
           <a:prstGeom prst="rect">
             <a:avLst/>
@@ -4270,132 +4270,6 @@
           </a:prstGeom>
         </p:spPr>
       </p:pic>
-      <p:grpSp>
-        <p:nvGrpSpPr>
-          <p:cNvPr id="6" name="Group 5">
-            <a:extLst>
-              <a:ext uri="{FF2B5EF4-FFF2-40B4-BE49-F238E27FC236}">
-                <a16:creationId xmlns:a16="http://schemas.microsoft.com/office/drawing/2014/main" id="{D08BB244-F0FF-F04D-8BFF-518E72F85FCC}"/>
-              </a:ext>
-            </a:extLst>
-          </p:cNvPr>
-          <p:cNvGrpSpPr/>
-          <p:nvPr/>
-        </p:nvGrpSpPr>
-        <p:grpSpPr>
-          <a:xfrm>
-            <a:off x="2040404" y="3303933"/>
-            <a:ext cx="1783718" cy="1068709"/>
-            <a:chOff x="2029776" y="3724733"/>
-            <a:chExt cx="2470969" cy="2416895"/>
-          </a:xfrm>
-        </p:grpSpPr>
-        <p:sp>
-          <p:nvSpPr>
-            <p:cNvPr id="3" name="Rectangle 2">
-              <a:extLst>
-                <a:ext uri="{FF2B5EF4-FFF2-40B4-BE49-F238E27FC236}">
-                  <a16:creationId xmlns:a16="http://schemas.microsoft.com/office/drawing/2014/main" id="{C2F65D24-7DB6-A147-BECA-9EA935B27F20}"/>
-                </a:ext>
-              </a:extLst>
-            </p:cNvPr>
-            <p:cNvSpPr/>
-            <p:nvPr/>
-          </p:nvSpPr>
-          <p:spPr>
-            <a:xfrm>
-              <a:off x="2029776" y="3727092"/>
-              <a:ext cx="2470969" cy="2414536"/>
-            </a:xfrm>
-            <a:prstGeom prst="rect">
-              <a:avLst/>
-            </a:prstGeom>
-            <a:solidFill>
-              <a:srgbClr val="007CBC">
-                <a:alpha val="9804"/>
-              </a:srgbClr>
-            </a:solidFill>
-            <a:ln w="12700">
-              <a:solidFill>
-                <a:srgbClr val="007DBC"/>
-              </a:solidFill>
-              <a:prstDash val="solid"/>
-            </a:ln>
-          </p:spPr>
-          <p:style>
-            <a:lnRef idx="2">
-              <a:schemeClr val="accent1">
-                <a:shade val="50000"/>
-              </a:schemeClr>
-            </a:lnRef>
-            <a:fillRef idx="1">
-              <a:schemeClr val="accent1"/>
-            </a:fillRef>
-            <a:effectRef idx="0">
-              <a:schemeClr val="accent1"/>
-            </a:effectRef>
-            <a:fontRef idx="minor">
-              <a:schemeClr val="lt1"/>
-            </a:fontRef>
-          </p:style>
-          <p:txBody>
-            <a:bodyPr rot="0" spcFirstLastPara="0" vertOverflow="overflow" horzOverflow="overflow" vert="horz" wrap="square" lIns="338328" tIns="45720" rIns="91440" bIns="45720" numCol="1" spcCol="0" rtlCol="0" fromWordArt="0" anchor="t" anchorCtr="0" forceAA="0" compatLnSpc="1">
-              <a:prstTxWarp prst="textNoShape">
-                <a:avLst/>
-              </a:prstTxWarp>
-              <a:noAutofit/>
-            </a:bodyPr>
-            <a:lstStyle/>
-            <a:p>
-              <a:pPr algn="l"/>
-              <a:r>
-                <a:rPr lang="en-US" sz="800" dirty="0">
-                  <a:solidFill>
-                    <a:srgbClr val="007DBC"/>
-                  </a:solidFill>
-                </a:rPr>
-                <a:t>TGW subnet</a:t>
-              </a:r>
-            </a:p>
-          </p:txBody>
-        </p:sp>
-        <p:pic>
-          <p:nvPicPr>
-            <p:cNvPr id="12" name="Graphic 11">
-              <a:extLst>
-                <a:ext uri="{FF2B5EF4-FFF2-40B4-BE49-F238E27FC236}">
-                  <a16:creationId xmlns:a16="http://schemas.microsoft.com/office/drawing/2014/main" id="{6DF2F2BD-5D9A-8046-A860-3517B0AB2957}"/>
-                </a:ext>
-              </a:extLst>
-            </p:cNvPr>
-            <p:cNvPicPr>
-              <a:picLocks noChangeAspect="1"/>
-            </p:cNvPicPr>
-            <p:nvPr/>
-          </p:nvPicPr>
-          <p:blipFill>
-            <a:blip r:embed="rId12">
-              <a:extLst>
-                <a:ext uri="{96DAC541-7B7A-43D3-8B79-37D633B846F1}">
-                  <asvg:svgBlip xmlns:asvg="http://schemas.microsoft.com/office/drawing/2016/SVG/main" r:embed="rId13"/>
-                </a:ext>
-              </a:extLst>
-            </a:blip>
-            <a:stretch>
-              <a:fillRect/>
-            </a:stretch>
-          </p:blipFill>
-          <p:spPr>
-            <a:xfrm>
-              <a:off x="2031500" y="3724733"/>
-              <a:ext cx="274320" cy="412654"/>
-            </a:xfrm>
-            <a:prstGeom prst="rect">
-              <a:avLst/>
-            </a:prstGeom>
-          </p:spPr>
-        </p:pic>
-      </p:grpSp>
       <p:sp>
         <p:nvSpPr>
           <p:cNvPr id="32" name="Rectangle 31">
@@ -4410,8 +4284,8 @@
         </p:nvSpPr>
         <p:spPr>
           <a:xfrm>
-            <a:off x="4344020" y="1595352"/>
-            <a:ext cx="2013078" cy="3262879"/>
+            <a:off x="4389460" y="1595353"/>
+            <a:ext cx="2013078" cy="2647810"/>
           </a:xfrm>
           <a:prstGeom prst="rect">
             <a:avLst/>
@@ -4475,7 +4349,7 @@
         </p:nvSpPr>
         <p:spPr>
           <a:xfrm>
-            <a:off x="3735455" y="4408299"/>
+            <a:off x="3727929" y="3720913"/>
             <a:ext cx="862434" cy="215444"/>
           </a:xfrm>
           <a:prstGeom prst="rect">
@@ -4605,132 +4479,6 @@
             <p:nvPr/>
           </p:nvPicPr>
           <p:blipFill>
-            <a:blip r:embed="rId14">
-              <a:extLst>
-                <a:ext uri="{96DAC541-7B7A-43D3-8B79-37D633B846F1}">
-                  <asvg:svgBlip xmlns:asvg="http://schemas.microsoft.com/office/drawing/2016/SVG/main" r:embed="rId15"/>
-                </a:ext>
-              </a:extLst>
-            </a:blip>
-            <a:stretch>
-              <a:fillRect/>
-            </a:stretch>
-          </p:blipFill>
-          <p:spPr>
-            <a:xfrm>
-              <a:off x="-573760" y="-3508587"/>
-              <a:ext cx="274320" cy="356501"/>
-            </a:xfrm>
-            <a:prstGeom prst="rect">
-              <a:avLst/>
-            </a:prstGeom>
-          </p:spPr>
-        </p:pic>
-      </p:grpSp>
-      <p:grpSp>
-        <p:nvGrpSpPr>
-          <p:cNvPr id="73" name="Group 72">
-            <a:extLst>
-              <a:ext uri="{FF2B5EF4-FFF2-40B4-BE49-F238E27FC236}">
-                <a16:creationId xmlns:a16="http://schemas.microsoft.com/office/drawing/2014/main" id="{D1F3ACFB-452A-CA47-B30B-B26F5C8876C5}"/>
-              </a:ext>
-            </a:extLst>
-          </p:cNvPr>
-          <p:cNvGrpSpPr/>
-          <p:nvPr/>
-        </p:nvGrpSpPr>
-        <p:grpSpPr>
-          <a:xfrm>
-            <a:off x="4509095" y="3307324"/>
-            <a:ext cx="1795757" cy="1062969"/>
-            <a:chOff x="2029776" y="3724733"/>
-            <a:chExt cx="2470969" cy="2416895"/>
-          </a:xfrm>
-        </p:grpSpPr>
-        <p:sp>
-          <p:nvSpPr>
-            <p:cNvPr id="74" name="Rectangle 73">
-              <a:extLst>
-                <a:ext uri="{FF2B5EF4-FFF2-40B4-BE49-F238E27FC236}">
-                  <a16:creationId xmlns:a16="http://schemas.microsoft.com/office/drawing/2014/main" id="{F3D6F7A2-29DB-4B49-A5AD-F103127A7496}"/>
-                </a:ext>
-              </a:extLst>
-            </p:cNvPr>
-            <p:cNvSpPr/>
-            <p:nvPr/>
-          </p:nvSpPr>
-          <p:spPr>
-            <a:xfrm>
-              <a:off x="2029776" y="3727092"/>
-              <a:ext cx="2470969" cy="2414536"/>
-            </a:xfrm>
-            <a:prstGeom prst="rect">
-              <a:avLst/>
-            </a:prstGeom>
-            <a:solidFill>
-              <a:srgbClr val="007CBC">
-                <a:alpha val="9804"/>
-              </a:srgbClr>
-            </a:solidFill>
-            <a:ln w="12700">
-              <a:solidFill>
-                <a:srgbClr val="007DBC"/>
-              </a:solidFill>
-              <a:prstDash val="solid"/>
-            </a:ln>
-          </p:spPr>
-          <p:style>
-            <a:lnRef idx="2">
-              <a:schemeClr val="accent1">
-                <a:shade val="50000"/>
-              </a:schemeClr>
-            </a:lnRef>
-            <a:fillRef idx="1">
-              <a:schemeClr val="accent1"/>
-            </a:fillRef>
-            <a:effectRef idx="0">
-              <a:schemeClr val="accent1"/>
-            </a:effectRef>
-            <a:fontRef idx="minor">
-              <a:schemeClr val="lt1"/>
-            </a:fontRef>
-          </p:style>
-          <p:txBody>
-            <a:bodyPr rot="0" spcFirstLastPara="0" vertOverflow="overflow" horzOverflow="overflow" vert="horz" wrap="square" lIns="338328" tIns="45720" rIns="91440" bIns="45720" numCol="1" spcCol="0" rtlCol="0" fromWordArt="0" anchor="t" anchorCtr="0" forceAA="0" compatLnSpc="1">
-              <a:prstTxWarp prst="textNoShape">
-                <a:avLst/>
-              </a:prstTxWarp>
-              <a:noAutofit/>
-            </a:bodyPr>
-            <a:lstStyle/>
-            <a:p>
-              <a:pPr algn="l"/>
-              <a:r>
-                <a:rPr lang="en-US" sz="800" dirty="0">
-                  <a:solidFill>
-                    <a:srgbClr val="007DBC"/>
-                  </a:solidFill>
-                </a:rPr>
-                <a:t>TGW subnet</a:t>
-              </a:r>
-            </a:p>
-          </p:txBody>
-        </p:sp>
-        <p:pic>
-          <p:nvPicPr>
-            <p:cNvPr id="75" name="Graphic 74">
-              <a:extLst>
-                <a:ext uri="{FF2B5EF4-FFF2-40B4-BE49-F238E27FC236}">
-                  <a16:creationId xmlns:a16="http://schemas.microsoft.com/office/drawing/2014/main" id="{6F99A9BB-39AE-314A-A7DB-A5747282A2D1}"/>
-                </a:ext>
-              </a:extLst>
-            </p:cNvPr>
-            <p:cNvPicPr>
-              <a:picLocks noChangeAspect="1"/>
-            </p:cNvPicPr>
-            <p:nvPr/>
-          </p:nvPicPr>
-          <p:blipFill>
             <a:blip r:embed="rId12">
               <a:extLst>
                 <a:ext uri="{96DAC541-7B7A-43D3-8B79-37D633B846F1}">
@@ -4744,8 +4492,8 @@
           </p:blipFill>
           <p:spPr>
             <a:xfrm>
-              <a:off x="2031500" y="3724733"/>
-              <a:ext cx="274320" cy="390063"/>
+              <a:off x="-573760" y="-3508587"/>
+              <a:ext cx="274320" cy="356501"/>
             </a:xfrm>
             <a:prstGeom prst="rect">
               <a:avLst/>
@@ -4857,10 +4605,10 @@
             <p:nvPr/>
           </p:nvPicPr>
           <p:blipFill>
-            <a:blip r:embed="rId14">
+            <a:blip r:embed="rId12">
               <a:extLst>
                 <a:ext uri="{96DAC541-7B7A-43D3-8B79-37D633B846F1}">
-                  <asvg:svgBlip xmlns:asvg="http://schemas.microsoft.com/office/drawing/2016/SVG/main" r:embed="rId15"/>
+                  <asvg:svgBlip xmlns:asvg="http://schemas.microsoft.com/office/drawing/2016/SVG/main" r:embed="rId13"/>
                 </a:ext>
               </a:extLst>
             </a:blip>
@@ -4894,10 +4642,10 @@
           <p:nvPr/>
         </p:nvPicPr>
         <p:blipFill>
-          <a:blip r:embed="rId16">
+          <a:blip r:embed="rId14">
             <a:extLst>
               <a:ext uri="{96DAC541-7B7A-43D3-8B79-37D633B846F1}">
-                <asvg:svgBlip xmlns:asvg="http://schemas.microsoft.com/office/drawing/2016/SVG/main" r:embed="rId17"/>
+                <asvg:svgBlip xmlns:asvg="http://schemas.microsoft.com/office/drawing/2016/SVG/main" r:embed="rId15"/>
               </a:ext>
             </a:extLst>
           </a:blip>
@@ -4915,48 +4663,12 @@
           </a:prstGeom>
         </p:spPr>
       </p:pic>
-      <p:sp>
-        <p:nvSpPr>
-          <p:cNvPr id="112" name="TextBox 111">
-            <a:extLst>
-              <a:ext uri="{FF2B5EF4-FFF2-40B4-BE49-F238E27FC236}">
-                <a16:creationId xmlns:a16="http://schemas.microsoft.com/office/drawing/2014/main" id="{15DA046D-DE77-3244-8EF5-0DBF716C7D5E}"/>
-              </a:ext>
-            </a:extLst>
-          </p:cNvPr>
-          <p:cNvSpPr txBox="1"/>
-          <p:nvPr/>
-        </p:nvSpPr>
-        <p:spPr>
-          <a:xfrm>
-            <a:off x="2410760" y="3950415"/>
-            <a:ext cx="904927" cy="215444"/>
-          </a:xfrm>
-          <a:prstGeom prst="rect">
-            <a:avLst/>
-          </a:prstGeom>
-          <a:noFill/>
-        </p:spPr>
-        <p:txBody>
-          <a:bodyPr wrap="square" rtlCol="0">
-            <a:spAutoFit/>
-          </a:bodyPr>
-          <a:lstStyle/>
-          <a:p>
-            <a:pPr algn="ctr"/>
-            <a:r>
-              <a:rPr lang="en-US" sz="800" dirty="0"/>
-              <a:t>TGW ENI</a:t>
-            </a:r>
-          </a:p>
-        </p:txBody>
-      </p:sp>
       <p:pic>
         <p:nvPicPr>
-          <p:cNvPr id="113" name="Graphic 112">
-            <a:extLst>
-              <a:ext uri="{FF2B5EF4-FFF2-40B4-BE49-F238E27FC236}">
-                <a16:creationId xmlns:a16="http://schemas.microsoft.com/office/drawing/2014/main" id="{C8B70B2E-4B28-5C4C-BCB6-E77CC47CEC63}"/>
+          <p:cNvPr id="166" name="Graphic 165">
+            <a:extLst>
+              <a:ext uri="{FF2B5EF4-FFF2-40B4-BE49-F238E27FC236}">
+                <a16:creationId xmlns:a16="http://schemas.microsoft.com/office/drawing/2014/main" id="{0F235836-38EA-7A49-9826-907CA3C155F7}"/>
               </a:ext>
             </a:extLst>
           </p:cNvPr>
@@ -4966,118 +4678,10 @@
           <p:nvPr/>
         </p:nvPicPr>
         <p:blipFill>
-          <a:blip r:embed="rId18">
+          <a:blip r:embed="rId14">
             <a:extLst>
               <a:ext uri="{96DAC541-7B7A-43D3-8B79-37D633B846F1}">
-                <asvg:svgBlip xmlns:asvg="http://schemas.microsoft.com/office/drawing/2016/SVG/main" r:embed="rId19"/>
-              </a:ext>
-            </a:extLst>
-          </a:blip>
-          <a:stretch>
-            <a:fillRect/>
-          </a:stretch>
-        </p:blipFill>
-        <p:spPr>
-          <a:xfrm>
-            <a:off x="2707038" y="3656193"/>
-            <a:ext cx="282406" cy="315878"/>
-          </a:xfrm>
-          <a:prstGeom prst="rect">
-            <a:avLst/>
-          </a:prstGeom>
-        </p:spPr>
-      </p:pic>
-      <p:sp>
-        <p:nvSpPr>
-          <p:cNvPr id="121" name="TextBox 120">
-            <a:extLst>
-              <a:ext uri="{FF2B5EF4-FFF2-40B4-BE49-F238E27FC236}">
-                <a16:creationId xmlns:a16="http://schemas.microsoft.com/office/drawing/2014/main" id="{662135C0-D63D-DD41-8D46-2F3DD688ADE2}"/>
-              </a:ext>
-            </a:extLst>
-          </p:cNvPr>
-          <p:cNvSpPr txBox="1"/>
-          <p:nvPr/>
-        </p:nvSpPr>
-        <p:spPr>
-          <a:xfrm>
-            <a:off x="5043516" y="3981992"/>
-            <a:ext cx="904927" cy="215444"/>
-          </a:xfrm>
-          <a:prstGeom prst="rect">
-            <a:avLst/>
-          </a:prstGeom>
-          <a:noFill/>
-        </p:spPr>
-        <p:txBody>
-          <a:bodyPr wrap="square" rtlCol="0">
-            <a:spAutoFit/>
-          </a:bodyPr>
-          <a:lstStyle/>
-          <a:p>
-            <a:pPr algn="ctr"/>
-            <a:r>
-              <a:rPr lang="en-US" sz="800" dirty="0"/>
-              <a:t>TGW ENI</a:t>
-            </a:r>
-          </a:p>
-        </p:txBody>
-      </p:sp>
-      <p:pic>
-        <p:nvPicPr>
-          <p:cNvPr id="122" name="Graphic 121">
-            <a:extLst>
-              <a:ext uri="{FF2B5EF4-FFF2-40B4-BE49-F238E27FC236}">
-                <a16:creationId xmlns:a16="http://schemas.microsoft.com/office/drawing/2014/main" id="{15F4A952-8B32-5F42-8612-574F00E762C9}"/>
-              </a:ext>
-            </a:extLst>
-          </p:cNvPr>
-          <p:cNvPicPr>
-            <a:picLocks noChangeAspect="1"/>
-          </p:cNvPicPr>
-          <p:nvPr/>
-        </p:nvPicPr>
-        <p:blipFill>
-          <a:blip r:embed="rId18">
-            <a:extLst>
-              <a:ext uri="{96DAC541-7B7A-43D3-8B79-37D633B846F1}">
-                <asvg:svgBlip xmlns:asvg="http://schemas.microsoft.com/office/drawing/2016/SVG/main" r:embed="rId19"/>
-              </a:ext>
-            </a:extLst>
-          </a:blip>
-          <a:stretch>
-            <a:fillRect/>
-          </a:stretch>
-        </p:blipFill>
-        <p:spPr>
-          <a:xfrm>
-            <a:off x="5334601" y="3662442"/>
-            <a:ext cx="282406" cy="315878"/>
-          </a:xfrm>
-          <a:prstGeom prst="rect">
-            <a:avLst/>
-          </a:prstGeom>
-        </p:spPr>
-      </p:pic>
-      <p:pic>
-        <p:nvPicPr>
-          <p:cNvPr id="166" name="Graphic 165">
-            <a:extLst>
-              <a:ext uri="{FF2B5EF4-FFF2-40B4-BE49-F238E27FC236}">
-                <a16:creationId xmlns:a16="http://schemas.microsoft.com/office/drawing/2014/main" id="{0F235836-38EA-7A49-9826-907CA3C155F7}"/>
-              </a:ext>
-            </a:extLst>
-          </p:cNvPr>
-          <p:cNvPicPr>
-            <a:picLocks noChangeAspect="1"/>
-          </p:cNvPicPr>
-          <p:nvPr/>
-        </p:nvPicPr>
-        <p:blipFill>
-          <a:blip r:embed="rId16">
-            <a:extLst>
-              <a:ext uri="{96DAC541-7B7A-43D3-8B79-37D633B846F1}">
-                <asvg:svgBlip xmlns:asvg="http://schemas.microsoft.com/office/drawing/2016/SVG/main" r:embed="rId17"/>
+                <asvg:svgBlip xmlns:asvg="http://schemas.microsoft.com/office/drawing/2016/SVG/main" r:embed="rId15"/>
               </a:ext>
             </a:extLst>
           </a:blip>
@@ -5206,10 +4810,10 @@
           <p:nvPr/>
         </p:nvPicPr>
         <p:blipFill>
-          <a:blip r:embed="rId20">
+          <a:blip r:embed="rId16">
             <a:extLst>
               <a:ext uri="{96DAC541-7B7A-43D3-8B79-37D633B846F1}">
-                <asvg:svgBlip xmlns:asvg="http://schemas.microsoft.com/office/drawing/2016/SVG/main" r:embed="rId21"/>
+                <asvg:svgBlip xmlns:asvg="http://schemas.microsoft.com/office/drawing/2016/SVG/main" r:embed="rId17"/>
               </a:ext>
             </a:extLst>
           </a:blip>
@@ -5274,74 +4878,27 @@
           </p:cNvPr>
           <p:cNvCxnSpPr>
             <a:cxnSpLocks/>
-            <a:stCxn id="113" idx="2"/>
+            <a:stCxn id="133" idx="2"/>
             <a:endCxn id="91" idx="0"/>
           </p:cNvCxnSpPr>
           <p:nvPr/>
         </p:nvCxnSpPr>
         <p:spPr>
           <a:xfrm rot="16200000" flipH="1">
-            <a:off x="2875419" y="3944892"/>
-            <a:ext cx="1230688" cy="1285045"/>
+            <a:off x="3611624" y="4407949"/>
+            <a:ext cx="983814" cy="3758"/>
           </a:xfrm>
           <a:prstGeom prst="bentConnector3">
             <a:avLst>
-              <a:gd name="adj1" fmla="val 54153"/>
+              <a:gd name="adj1" fmla="val 50000"/>
             </a:avLst>
           </a:prstGeom>
-          <a:ln>
+          <a:ln cap="rnd">
             <a:solidFill>
               <a:srgbClr val="FF0000"/>
             </a:solidFill>
             <a:prstDash val="dash"/>
-          </a:ln>
-        </p:spPr>
-        <p:style>
-          <a:lnRef idx="1">
-            <a:schemeClr val="accent1"/>
-          </a:lnRef>
-          <a:fillRef idx="0">
-            <a:schemeClr val="accent1"/>
-          </a:fillRef>
-          <a:effectRef idx="0">
-            <a:schemeClr val="accent1"/>
-          </a:effectRef>
-          <a:fontRef idx="minor">
-            <a:schemeClr val="tx1"/>
-          </a:fontRef>
-        </p:style>
-      </p:cxnSp>
-      <p:cxnSp>
-        <p:nvCxnSpPr>
-          <p:cNvPr id="265" name="Elbow Connector 264">
-            <a:extLst>
-              <a:ext uri="{FF2B5EF4-FFF2-40B4-BE49-F238E27FC236}">
-                <a16:creationId xmlns:a16="http://schemas.microsoft.com/office/drawing/2014/main" id="{6FA12118-6311-B047-ABE5-A9E6D84CC9A3}"/>
-              </a:ext>
-            </a:extLst>
-          </p:cNvPr>
-          <p:cNvCxnSpPr>
-            <a:cxnSpLocks/>
-            <a:stCxn id="122" idx="2"/>
-            <a:endCxn id="91" idx="0"/>
-          </p:cNvCxnSpPr>
-          <p:nvPr/>
-        </p:nvCxnSpPr>
-        <p:spPr>
-          <a:xfrm rot="5400000">
-            <a:off x="4192326" y="3919280"/>
-            <a:ext cx="1224439" cy="1342518"/>
-          </a:xfrm>
-          <a:prstGeom prst="bentConnector3">
-            <a:avLst>
-              <a:gd name="adj1" fmla="val 54175"/>
-            </a:avLst>
-          </a:prstGeom>
-          <a:ln>
-            <a:solidFill>
-              <a:srgbClr val="FF0000"/>
-            </a:solidFill>
-            <a:prstDash val="dash"/>
+            <a:headEnd type="oval"/>
             <a:tailEnd type="oval"/>
           </a:ln>
         </p:spPr>
@@ -5378,8 +4935,8 @@
         </p:nvCxnSpPr>
         <p:spPr>
           <a:xfrm rot="16200000" flipV="1">
-            <a:off x="4542402" y="5081545"/>
-            <a:ext cx="522857" cy="1341087"/>
+            <a:off x="4528464" y="4766583"/>
+            <a:ext cx="522857" cy="1368963"/>
           </a:xfrm>
           <a:prstGeom prst="bentConnector3">
             <a:avLst>
@@ -5425,7 +4982,7 @@
         </p:nvSpPr>
         <p:spPr>
           <a:xfrm>
-            <a:off x="3529692" y="4907742"/>
+            <a:off x="3529692" y="4606718"/>
             <a:ext cx="1257001" cy="215444"/>
           </a:xfrm>
           <a:prstGeom prst="rect">
@@ -5676,7 +5233,7 @@
         <p:spPr>
           <a:xfrm>
             <a:off x="1787452" y="1822260"/>
-            <a:ext cx="4628399" cy="2857038"/>
+            <a:ext cx="4628399" cy="2095661"/>
           </a:xfrm>
           <a:prstGeom prst="rect">
             <a:avLst/>
@@ -5751,7 +5308,7 @@
         </p:blipFill>
         <p:spPr>
           <a:xfrm>
-            <a:off x="2445367" y="6007257"/>
+            <a:off x="2445367" y="5706233"/>
             <a:ext cx="180312" cy="212423"/>
           </a:xfrm>
           <a:prstGeom prst="rect">
@@ -5777,8 +5334,8 @@
         </p:nvCxnSpPr>
         <p:spPr>
           <a:xfrm rot="5400000" flipH="1" flipV="1">
-            <a:off x="3269908" y="5146850"/>
-            <a:ext cx="519568" cy="1207188"/>
+            <a:off x="3255970" y="4859764"/>
+            <a:ext cx="519568" cy="1179312"/>
           </a:xfrm>
           <a:prstGeom prst="bentConnector3">
             <a:avLst>
@@ -5825,10 +5382,10 @@
           <p:nvPr/>
         </p:nvPicPr>
         <p:blipFill>
-          <a:blip r:embed="rId20">
+          <a:blip r:embed="rId16">
             <a:extLst>
               <a:ext uri="{96DAC541-7B7A-43D3-8B79-37D633B846F1}">
-                <asvg:svgBlip xmlns:asvg="http://schemas.microsoft.com/office/drawing/2016/SVG/main" r:embed="rId21"/>
+                <asvg:svgBlip xmlns:asvg="http://schemas.microsoft.com/office/drawing/2016/SVG/main" r:embed="rId17"/>
               </a:ext>
             </a:extLst>
           </a:blip>
@@ -5861,10 +5418,10 @@
           <p:nvPr/>
         </p:nvPicPr>
         <p:blipFill>
-          <a:blip r:embed="rId20">
+          <a:blip r:embed="rId16">
             <a:extLst>
               <a:ext uri="{96DAC541-7B7A-43D3-8B79-37D633B846F1}">
-                <asvg:svgBlip xmlns:asvg="http://schemas.microsoft.com/office/drawing/2016/SVG/main" r:embed="rId21"/>
+                <asvg:svgBlip xmlns:asvg="http://schemas.microsoft.com/office/drawing/2016/SVG/main" r:embed="rId17"/>
               </a:ext>
             </a:extLst>
           </a:blip>
@@ -5897,10 +5454,10 @@
           <p:nvPr/>
         </p:nvPicPr>
         <p:blipFill>
-          <a:blip r:embed="rId20">
+          <a:blip r:embed="rId16">
             <a:extLst>
               <a:ext uri="{96DAC541-7B7A-43D3-8B79-37D633B846F1}">
-                <asvg:svgBlip xmlns:asvg="http://schemas.microsoft.com/office/drawing/2016/SVG/main" r:embed="rId21"/>
+                <asvg:svgBlip xmlns:asvg="http://schemas.microsoft.com/office/drawing/2016/SVG/main" r:embed="rId17"/>
               </a:ext>
             </a:extLst>
           </a:blip>
@@ -6214,10 +5771,10 @@
       </p:cxnSp>
       <p:sp>
         <p:nvSpPr>
-          <p:cNvPr id="66" name="TextBox 65">
-            <a:extLst>
-              <a:ext uri="{FF2B5EF4-FFF2-40B4-BE49-F238E27FC236}">
-                <a16:creationId xmlns:a16="http://schemas.microsoft.com/office/drawing/2014/main" id="{5311EA60-FAF5-4044-9D65-3F5A2E9C26A9}"/>
+          <p:cNvPr id="82" name="TextBox 81">
+            <a:extLst>
+              <a:ext uri="{FF2B5EF4-FFF2-40B4-BE49-F238E27FC236}">
+                <a16:creationId xmlns:a16="http://schemas.microsoft.com/office/drawing/2014/main" id="{CFA44E17-CC07-6D45-877F-E6BBED413169}"/>
               </a:ext>
             </a:extLst>
           </p:cNvPr>
@@ -6226,87 +5783,7 @@
         </p:nvSpPr>
         <p:spPr>
           <a:xfrm>
-            <a:off x="2713033" y="4187344"/>
-            <a:ext cx="862887" cy="215444"/>
-          </a:xfrm>
-          <a:prstGeom prst="rect">
-            <a:avLst/>
-          </a:prstGeom>
-          <a:noFill/>
-        </p:spPr>
-        <p:txBody>
-          <a:bodyPr wrap="square" rtlCol="0">
-            <a:spAutoFit/>
-          </a:bodyPr>
-          <a:lstStyle/>
-          <a:p>
-            <a:pPr algn="ctr"/>
-            <a:r>
-              <a:rPr lang="en-US" sz="800" dirty="0">
-                <a:solidFill>
-                  <a:srgbClr val="007DBC"/>
-                </a:solidFill>
-              </a:rPr>
-              <a:t>10.249.2.0/24</a:t>
-            </a:r>
-          </a:p>
-        </p:txBody>
-      </p:sp>
-      <p:sp>
-        <p:nvSpPr>
-          <p:cNvPr id="67" name="TextBox 66">
-            <a:extLst>
-              <a:ext uri="{FF2B5EF4-FFF2-40B4-BE49-F238E27FC236}">
-                <a16:creationId xmlns:a16="http://schemas.microsoft.com/office/drawing/2014/main" id="{F684F1E9-A991-5E42-A8E5-4DA6489CE5BE}"/>
-              </a:ext>
-            </a:extLst>
-          </p:cNvPr>
-          <p:cNvSpPr txBox="1"/>
-          <p:nvPr/>
-        </p:nvSpPr>
-        <p:spPr>
-          <a:xfrm>
-            <a:off x="5355411" y="4189122"/>
-            <a:ext cx="862887" cy="215444"/>
-          </a:xfrm>
-          <a:prstGeom prst="rect">
-            <a:avLst/>
-          </a:prstGeom>
-          <a:noFill/>
-        </p:spPr>
-        <p:txBody>
-          <a:bodyPr wrap="square" rtlCol="0">
-            <a:spAutoFit/>
-          </a:bodyPr>
-          <a:lstStyle/>
-          <a:p>
-            <a:pPr algn="ctr"/>
-            <a:r>
-              <a:rPr lang="en-US" sz="800" dirty="0">
-                <a:solidFill>
-                  <a:srgbClr val="007DBC"/>
-                </a:solidFill>
-              </a:rPr>
-              <a:t>10.249.3.0/24</a:t>
-            </a:r>
-          </a:p>
-        </p:txBody>
-      </p:sp>
-      <p:sp>
-        <p:nvSpPr>
-          <p:cNvPr id="82" name="TextBox 81">
-            <a:extLst>
-              <a:ext uri="{FF2B5EF4-FFF2-40B4-BE49-F238E27FC236}">
-                <a16:creationId xmlns:a16="http://schemas.microsoft.com/office/drawing/2014/main" id="{CFA44E17-CC07-6D45-877F-E6BBED413169}"/>
-              </a:ext>
-            </a:extLst>
-          </p:cNvPr>
-          <p:cNvSpPr txBox="1"/>
-          <p:nvPr/>
-        </p:nvSpPr>
-        <p:spPr>
-          <a:xfrm>
-            <a:off x="2503963" y="6219680"/>
+            <a:off x="2537136" y="5900509"/>
             <a:ext cx="783623" cy="215444"/>
           </a:xfrm>
           <a:prstGeom prst="rect">
@@ -6347,7 +5824,7 @@
           <p:nvPr/>
         </p:nvPicPr>
         <p:blipFill>
-          <a:blip r:embed="rId22">
+          <a:blip r:embed="rId18">
             <a:extLst>
               <a:ext uri="{28A0092B-C50C-407E-A947-70E740481C1C}">
                 <a14:useLocalDpi xmlns:a14="http://schemas.microsoft.com/office/drawing/2010/main" val="0"/>
@@ -6567,7 +6044,7 @@
           <p:nvPr/>
         </p:nvPicPr>
         <p:blipFill>
-          <a:blip r:embed="rId23">
+          <a:blip r:embed="rId19">
             <a:extLst>
               <a:ext uri="{28A0092B-C50C-407E-A947-70E740481C1C}">
                 <a14:useLocalDpi xmlns:a14="http://schemas.microsoft.com/office/drawing/2010/main" val="0"/>
@@ -6788,10 +6265,10 @@
           <p:nvPr/>
         </p:nvPicPr>
         <p:blipFill>
-          <a:blip r:embed="rId24">
+          <a:blip r:embed="rId20">
             <a:extLst>
               <a:ext uri="{96DAC541-7B7A-43D3-8B79-37D633B846F1}">
-                <asvg:svgBlip xmlns:asvg="http://schemas.microsoft.com/office/drawing/2016/SVG/main" r:embed="rId25"/>
+                <asvg:svgBlip xmlns:asvg="http://schemas.microsoft.com/office/drawing/2016/SVG/main" r:embed="rId21"/>
               </a:ext>
             </a:extLst>
           </a:blip>
@@ -6800,7 +6277,7 @@
         </p:blipFill>
         <p:spPr bwMode="auto">
           <a:xfrm>
-            <a:off x="3953094" y="2241712"/>
+            <a:off x="3953094" y="2332588"/>
             <a:ext cx="360384" cy="360384"/>
           </a:xfrm>
           <a:prstGeom prst="rect">
@@ -6847,7 +6324,7 @@
         </p:nvSpPr>
         <p:spPr bwMode="auto">
           <a:xfrm>
-            <a:off x="3481151" y="1992762"/>
+            <a:off x="3481151" y="2083638"/>
             <a:ext cx="1270000" cy="307777"/>
           </a:xfrm>
           <a:prstGeom prst="rect">
@@ -7061,10 +6538,10 @@
           <p:nvPr/>
         </p:nvPicPr>
         <p:blipFill>
-          <a:blip r:embed="rId24">
+          <a:blip r:embed="rId20">
             <a:extLst>
               <a:ext uri="{96DAC541-7B7A-43D3-8B79-37D633B846F1}">
-                <asvg:svgBlip xmlns:asvg="http://schemas.microsoft.com/office/drawing/2016/SVG/main" r:embed="rId25"/>
+                <asvg:svgBlip xmlns:asvg="http://schemas.microsoft.com/office/drawing/2016/SVG/main" r:embed="rId21"/>
               </a:ext>
             </a:extLst>
           </a:blip>
@@ -7073,7 +6550,7 @@
         </p:blipFill>
         <p:spPr bwMode="auto">
           <a:xfrm>
-            <a:off x="4407754" y="5125040"/>
+            <a:off x="4407754" y="4824016"/>
             <a:ext cx="292371" cy="292371"/>
           </a:xfrm>
           <a:prstGeom prst="rect">
@@ -7118,7 +6595,7 @@
         </p:nvSpPr>
         <p:spPr>
           <a:xfrm>
-            <a:off x="2547728" y="5976592"/>
+            <a:off x="2547728" y="5675568"/>
             <a:ext cx="835446" cy="215444"/>
           </a:xfrm>
           <a:prstGeom prst="rect">
@@ -7158,7 +6635,7 @@
         </p:nvSpPr>
         <p:spPr>
           <a:xfrm>
-            <a:off x="4993643" y="6013517"/>
+            <a:off x="4993643" y="5712493"/>
             <a:ext cx="961460" cy="373113"/>
           </a:xfrm>
           <a:prstGeom prst="rect">
@@ -7234,7 +6711,7 @@
         </p:blipFill>
         <p:spPr>
           <a:xfrm>
-            <a:off x="4993642" y="6010546"/>
+            <a:off x="4993642" y="5709522"/>
             <a:ext cx="180312" cy="212423"/>
           </a:xfrm>
           <a:prstGeom prst="rect">
@@ -7256,7 +6733,7 @@
         </p:nvSpPr>
         <p:spPr>
           <a:xfrm>
-            <a:off x="5094561" y="5976592"/>
+            <a:off x="5094561" y="5675568"/>
             <a:ext cx="835446" cy="215444"/>
           </a:xfrm>
           <a:prstGeom prst="rect">
@@ -7296,7 +6773,7 @@
         </p:nvSpPr>
         <p:spPr>
           <a:xfrm>
-            <a:off x="5052426" y="6217182"/>
+            <a:off x="5094561" y="5915677"/>
             <a:ext cx="783623" cy="215444"/>
           </a:xfrm>
           <a:prstGeom prst="rect">
@@ -7338,7 +6815,7 @@
         </p:nvSpPr>
         <p:spPr bwMode="auto">
           <a:xfrm>
-            <a:off x="3918939" y="5348196"/>
+            <a:off x="3918939" y="5047172"/>
             <a:ext cx="1270000" cy="276999"/>
           </a:xfrm>
           <a:prstGeom prst="rect">
@@ -7513,7 +6990,7 @@
           <p:nvPr/>
         </p:nvPicPr>
         <p:blipFill>
-          <a:blip r:embed="rId26">
+          <a:blip r:embed="rId22">
             <a:extLst>
               <a:ext uri="{28A0092B-C50C-407E-A947-70E740481C1C}">
                 <a14:useLocalDpi xmlns:a14="http://schemas.microsoft.com/office/drawing/2010/main" val="0"/>
@@ -7970,7 +7447,7 @@
         </p:nvCxnSpPr>
         <p:spPr>
           <a:xfrm rot="16200000" flipH="1">
-            <a:off x="5126267" y="1609115"/>
+            <a:off x="5126267" y="1699991"/>
             <a:ext cx="648683" cy="2634644"/>
           </a:xfrm>
           <a:prstGeom prst="bentConnector2">
@@ -8019,11 +7496,11 @@
         <p:spPr>
           <a:xfrm rot="10800000" flipV="1">
             <a:off x="4700126" y="3363108"/>
-            <a:ext cx="2060079" cy="1908117"/>
+            <a:ext cx="2060079" cy="1607093"/>
           </a:xfrm>
           <a:prstGeom prst="bentConnector3">
             <a:avLst>
-              <a:gd name="adj1" fmla="val 12978"/>
+              <a:gd name="adj1" fmla="val 13884"/>
             </a:avLst>
           </a:prstGeom>
           <a:ln>

</xml_diff>